<commit_message>
Updating the institutions banner
</commit_message>
<xml_diff>
--- a/_resources_raw/Universities_Logo.pptx
+++ b/_resources_raw/Universities_Logo.pptx
@@ -288,7 +288,7 @@
           <a:p>
             <a:fld id="{1571E649-7166-D344-9ADC-D5262CCE6E57}" type="datetimeFigureOut">
               <a:rPr lang="en-US" smtClean="0"/>
-              <a:t>11/06/2014</a:t>
+              <a:t>04/10/2014</a:t>
             </a:fld>
             <a:endParaRPr lang="en-US"/>
           </a:p>
@@ -458,7 +458,7 @@
           <a:p>
             <a:fld id="{1571E649-7166-D344-9ADC-D5262CCE6E57}" type="datetimeFigureOut">
               <a:rPr lang="en-US" smtClean="0"/>
-              <a:t>11/06/2014</a:t>
+              <a:t>04/10/2014</a:t>
             </a:fld>
             <a:endParaRPr lang="en-US"/>
           </a:p>
@@ -638,7 +638,7 @@
           <a:p>
             <a:fld id="{1571E649-7166-D344-9ADC-D5262CCE6E57}" type="datetimeFigureOut">
               <a:rPr lang="en-US" smtClean="0"/>
-              <a:t>11/06/2014</a:t>
+              <a:t>04/10/2014</a:t>
             </a:fld>
             <a:endParaRPr lang="en-US"/>
           </a:p>
@@ -808,7 +808,7 @@
           <a:p>
             <a:fld id="{1571E649-7166-D344-9ADC-D5262CCE6E57}" type="datetimeFigureOut">
               <a:rPr lang="en-US" smtClean="0"/>
-              <a:t>11/06/2014</a:t>
+              <a:t>04/10/2014</a:t>
             </a:fld>
             <a:endParaRPr lang="en-US"/>
           </a:p>
@@ -1054,7 +1054,7 @@
           <a:p>
             <a:fld id="{1571E649-7166-D344-9ADC-D5262CCE6E57}" type="datetimeFigureOut">
               <a:rPr lang="en-US" smtClean="0"/>
-              <a:t>11/06/2014</a:t>
+              <a:t>04/10/2014</a:t>
             </a:fld>
             <a:endParaRPr lang="en-US"/>
           </a:p>
@@ -1342,7 +1342,7 @@
           <a:p>
             <a:fld id="{1571E649-7166-D344-9ADC-D5262CCE6E57}" type="datetimeFigureOut">
               <a:rPr lang="en-US" smtClean="0"/>
-              <a:t>11/06/2014</a:t>
+              <a:t>04/10/2014</a:t>
             </a:fld>
             <a:endParaRPr lang="en-US"/>
           </a:p>
@@ -1764,7 +1764,7 @@
           <a:p>
             <a:fld id="{1571E649-7166-D344-9ADC-D5262CCE6E57}" type="datetimeFigureOut">
               <a:rPr lang="en-US" smtClean="0"/>
-              <a:t>11/06/2014</a:t>
+              <a:t>04/10/2014</a:t>
             </a:fld>
             <a:endParaRPr lang="en-US"/>
           </a:p>
@@ -1882,7 +1882,7 @@
           <a:p>
             <a:fld id="{1571E649-7166-D344-9ADC-D5262CCE6E57}" type="datetimeFigureOut">
               <a:rPr lang="en-US" smtClean="0"/>
-              <a:t>11/06/2014</a:t>
+              <a:t>04/10/2014</a:t>
             </a:fld>
             <a:endParaRPr lang="en-US"/>
           </a:p>
@@ -1977,7 +1977,7 @@
           <a:p>
             <a:fld id="{1571E649-7166-D344-9ADC-D5262CCE6E57}" type="datetimeFigureOut">
               <a:rPr lang="en-US" smtClean="0"/>
-              <a:t>11/06/2014</a:t>
+              <a:t>04/10/2014</a:t>
             </a:fld>
             <a:endParaRPr lang="en-US"/>
           </a:p>
@@ -2254,7 +2254,7 @@
           <a:p>
             <a:fld id="{1571E649-7166-D344-9ADC-D5262CCE6E57}" type="datetimeFigureOut">
               <a:rPr lang="en-US" smtClean="0"/>
-              <a:t>11/06/2014</a:t>
+              <a:t>04/10/2014</a:t>
             </a:fld>
             <a:endParaRPr lang="en-US"/>
           </a:p>
@@ -2507,7 +2507,7 @@
           <a:p>
             <a:fld id="{1571E649-7166-D344-9ADC-D5262CCE6E57}" type="datetimeFigureOut">
               <a:rPr lang="en-US" smtClean="0"/>
-              <a:t>11/06/2014</a:t>
+              <a:t>04/10/2014</a:t>
             </a:fld>
             <a:endParaRPr lang="en-US"/>
           </a:p>
@@ -2720,7 +2720,7 @@
           <a:p>
             <a:fld id="{1571E649-7166-D344-9ADC-D5262CCE6E57}" type="datetimeFigureOut">
               <a:rPr lang="en-US" smtClean="0"/>
-              <a:t>11/06/2014</a:t>
+              <a:t>04/10/2014</a:t>
             </a:fld>
             <a:endParaRPr lang="en-US"/>
           </a:p>
@@ -3117,7 +3117,7 @@
         </p:blipFill>
         <p:spPr>
           <a:xfrm>
-            <a:off x="7806293" y="48533"/>
+            <a:off x="7450709" y="48533"/>
             <a:ext cx="2132822" cy="946973"/>
           </a:xfrm>
           <a:prstGeom prst="rect">
@@ -3147,7 +3147,7 @@
         </p:blipFill>
         <p:spPr>
           <a:xfrm>
-            <a:off x="4644224" y="65911"/>
+            <a:off x="1545595" y="65911"/>
             <a:ext cx="2774256" cy="974481"/>
           </a:xfrm>
           <a:prstGeom prst="rect">
@@ -3157,7 +3157,7 @@
       </p:pic>
       <p:pic>
         <p:nvPicPr>
-          <p:cNvPr id="8" name="Picture 7" descr="reading_logo.png"/>
+          <p:cNvPr id="9" name="Picture 8" descr="RResLogoR.jpg"/>
           <p:cNvPicPr>
             <a:picLocks noChangeAspect="1"/>
           </p:cNvPicPr>
@@ -3177,8 +3177,8 @@
         </p:blipFill>
         <p:spPr>
           <a:xfrm>
-            <a:off x="1388272" y="0"/>
-            <a:ext cx="2949917" cy="1073230"/>
+            <a:off x="60953" y="18053"/>
+            <a:ext cx="803925" cy="1079500"/>
           </a:xfrm>
           <a:prstGeom prst="rect">
             <a:avLst/>
@@ -3187,7 +3187,7 @@
       </p:pic>
       <p:pic>
         <p:nvPicPr>
-          <p:cNvPr id="9" name="Picture 8" descr="RResLogoR.jpg"/>
+          <p:cNvPr id="2" name="Picture 1" descr="edinburgh_university_logo.jpg"/>
           <p:cNvPicPr>
             <a:picLocks noChangeAspect="1"/>
           </p:cNvPicPr>
@@ -3207,8 +3207,8 @@
         </p:blipFill>
         <p:spPr>
           <a:xfrm>
-            <a:off x="60953" y="0"/>
-            <a:ext cx="803925" cy="1079500"/>
+            <a:off x="10250876" y="-73379"/>
+            <a:ext cx="1240722" cy="1154411"/>
           </a:xfrm>
           <a:prstGeom prst="rect">
             <a:avLst/>
@@ -3217,7 +3217,7 @@
       </p:pic>
       <p:pic>
         <p:nvPicPr>
-          <p:cNvPr id="2" name="Picture 1" descr="edinburgh_university_logo.jpg"/>
+          <p:cNvPr id="5" name="Picture 4" descr="images.jpg"/>
           <p:cNvPicPr>
             <a:picLocks noChangeAspect="1"/>
           </p:cNvPicPr>
@@ -3237,8 +3237,8 @@
         </p:blipFill>
         <p:spPr>
           <a:xfrm>
-            <a:off x="10361865" y="-39108"/>
-            <a:ext cx="1160210" cy="1079500"/>
+            <a:off x="4828006" y="37092"/>
+            <a:ext cx="1908117" cy="1003300"/>
           </a:xfrm>
           <a:prstGeom prst="rect">
             <a:avLst/>

</xml_diff>